<commit_message>
Second Internship Presentation PPT Commit
</commit_message>
<xml_diff>
--- a/DataInn-Yunus-Bagewadi-Internship-101.pptx
+++ b/DataInn-Yunus-Bagewadi-Internship-101.pptx
@@ -6274,12 +6274,14 @@
         </p:nvSpPr>
         <p:spPr>
           <a:xfrm>
-            <a:off x="220345" y="191770"/>
-            <a:ext cx="2760345" cy="1455420"/>
+            <a:off x="93980" y="76200"/>
+            <a:ext cx="3029585" cy="1661160"/>
           </a:xfrm>
         </p:spPr>
         <p:txBody>
-          <a:bodyPr/>
+          <a:bodyPr>
+            <a:normAutofit lnSpcReduction="10000"/>
+          </a:bodyPr>
           <a:p>
             <a:pPr marL="0" indent="0">
               <a:buNone/>
@@ -6290,9 +6292,238 @@
                 <a:cs typeface="Bahnschrift" panose="020B0502040204020203" charset="0"/>
                 <a:sym typeface="+mn-ea"/>
               </a:rPr>
-              <a:t>Week-5-Tasks (Ongoing):</a:t>
-            </a:r>
-            <a:endParaRPr lang="en-US" sz="600" b="1">
+              <a:t>Week-5-Tasks:</a:t>
+            </a:r>
+            <a:endParaRPr lang="en-US" altLang="en-US" sz="600" b="1">
+              <a:latin typeface="Bahnschrift" panose="020B0502040204020203" charset="0"/>
+              <a:cs typeface="Bahnschrift" panose="020B0502040204020203" charset="0"/>
+            </a:endParaRPr>
+          </a:p>
+          <a:p>
+            <a:pPr marL="0" indent="0">
+              <a:buNone/>
+            </a:pPr>
+            <a:r>
+              <a:rPr lang="en-US" altLang="en-US" sz="600" b="1">
+                <a:latin typeface="Bahnschrift" panose="020B0502040204020203" charset="0"/>
+                <a:cs typeface="Bahnschrift" panose="020B0502040204020203" charset="0"/>
+                <a:sym typeface="+mn-ea"/>
+              </a:rPr>
+              <a:t>◦ </a:t>
+            </a:r>
+            <a:r>
+              <a:rPr lang="en-US" altLang="en-US" sz="600">
+                <a:latin typeface="Bahnschrift" panose="020B0502040204020203" charset="0"/>
+                <a:cs typeface="Bahnschrift" panose="020B0502040204020203" charset="0"/>
+              </a:rPr>
+              <a:t>Build a basic </a:t>
+            </a:r>
+            <a:r>
+              <a:rPr lang="en-US" altLang="en-US" sz="600" b="1">
+                <a:latin typeface="Bahnschrift" panose="020B0502040204020203" charset="0"/>
+                <a:cs typeface="Bahnschrift" panose="020B0502040204020203" charset="0"/>
+              </a:rPr>
+              <a:t>REST API</a:t>
+            </a:r>
+            <a:r>
+              <a:rPr lang="en-US" altLang="en-US" sz="600">
+                <a:latin typeface="Bahnschrift" panose="020B0502040204020203" charset="0"/>
+                <a:cs typeface="Bahnschrift" panose="020B0502040204020203" charset="0"/>
+              </a:rPr>
+              <a:t> using </a:t>
+            </a:r>
+            <a:r>
+              <a:rPr lang="en-US" altLang="en-US" sz="600" b="1">
+                <a:latin typeface="Bahnschrift" panose="020B0502040204020203" charset="0"/>
+                <a:cs typeface="Bahnschrift" panose="020B0502040204020203" charset="0"/>
+              </a:rPr>
+              <a:t>Spring Boot</a:t>
+            </a:r>
+            <a:r>
+              <a:rPr lang="en-US" altLang="en-US" sz="600">
+                <a:latin typeface="Bahnschrift" panose="020B0502040204020203" charset="0"/>
+                <a:cs typeface="Bahnschrift" panose="020B0502040204020203" charset="0"/>
+              </a:rPr>
+              <a:t> that performs CRUD operations on a database table.</a:t>
+            </a:r>
+            <a:endParaRPr lang="en-US" altLang="en-US" sz="600">
+              <a:latin typeface="Bahnschrift" panose="020B0502040204020203" charset="0"/>
+              <a:cs typeface="Bahnschrift" panose="020B0502040204020203" charset="0"/>
+            </a:endParaRPr>
+          </a:p>
+          <a:p>
+            <a:pPr marL="0" indent="0">
+              <a:buNone/>
+            </a:pPr>
+            <a:r>
+              <a:rPr lang="en-US" altLang="en-US" sz="600" b="1">
+                <a:latin typeface="Bahnschrift" panose="020B0502040204020203" charset="0"/>
+                <a:cs typeface="Bahnschrift" panose="020B0502040204020203" charset="0"/>
+                <a:sym typeface="+mn-ea"/>
+              </a:rPr>
+              <a:t>◦ </a:t>
+            </a:r>
+            <a:r>
+              <a:rPr lang="en-US" altLang="en-US" sz="600">
+                <a:latin typeface="Bahnschrift" panose="020B0502040204020203" charset="0"/>
+                <a:cs typeface="Bahnschrift" panose="020B0502040204020203" charset="0"/>
+              </a:rPr>
+              <a:t>Created </a:t>
+            </a:r>
+            <a:r>
+              <a:rPr lang="en-US" altLang="en-US" sz="600" b="1">
+                <a:latin typeface="Bahnschrift" panose="020B0502040204020203" charset="0"/>
+                <a:cs typeface="Bahnschrift" panose="020B0502040204020203" charset="0"/>
+              </a:rPr>
+              <a:t>Entity (Class)</a:t>
+            </a:r>
+            <a:r>
+              <a:rPr lang="en-US" altLang="en-US" sz="600">
+                <a:latin typeface="Bahnschrift" panose="020B0502040204020203" charset="0"/>
+                <a:cs typeface="Bahnschrift" panose="020B0502040204020203" charset="0"/>
+              </a:rPr>
+              <a:t>,</a:t>
+            </a:r>
+            <a:r>
+              <a:rPr lang="en-US" altLang="en-US" sz="600" b="1">
+                <a:latin typeface="Bahnschrift" panose="020B0502040204020203" charset="0"/>
+                <a:cs typeface="Bahnschrift" panose="020B0502040204020203" charset="0"/>
+              </a:rPr>
+              <a:t> JPA Repository</a:t>
+            </a:r>
+            <a:r>
+              <a:rPr lang="en-US" altLang="en-US" sz="600">
+                <a:latin typeface="Bahnschrift" panose="020B0502040204020203" charset="0"/>
+                <a:cs typeface="Bahnschrift" panose="020B0502040204020203" charset="0"/>
+              </a:rPr>
+              <a:t>, </a:t>
+            </a:r>
+            <a:r>
+              <a:rPr lang="en-US" altLang="en-US" sz="600" b="1">
+                <a:latin typeface="Bahnschrift" panose="020B0502040204020203" charset="0"/>
+                <a:cs typeface="Bahnschrift" panose="020B0502040204020203" charset="0"/>
+              </a:rPr>
+              <a:t>Service Layer</a:t>
+            </a:r>
+            <a:r>
+              <a:rPr lang="en-US" altLang="en-US" sz="600">
+                <a:latin typeface="Bahnschrift" panose="020B0502040204020203" charset="0"/>
+                <a:cs typeface="Bahnschrift" panose="020B0502040204020203" charset="0"/>
+              </a:rPr>
+              <a:t> and </a:t>
+            </a:r>
+            <a:r>
+              <a:rPr lang="en-US" altLang="en-US" sz="600" b="1">
+                <a:latin typeface="Bahnschrift" panose="020B0502040204020203" charset="0"/>
+                <a:cs typeface="Bahnschrift" panose="020B0502040204020203" charset="0"/>
+              </a:rPr>
+              <a:t>Rest APIs Controller</a:t>
+            </a:r>
+            <a:r>
+              <a:rPr lang="en-US" altLang="en-US" sz="600">
+                <a:latin typeface="Bahnschrift" panose="020B0502040204020203" charset="0"/>
+                <a:cs typeface="Bahnschrift" panose="020B0502040204020203" charset="0"/>
+              </a:rPr>
+              <a:t> with standard methods such as </a:t>
+            </a:r>
+            <a:r>
+              <a:rPr lang="en-US" altLang="en-US" sz="600" b="1">
+                <a:latin typeface="Bahnschrift" panose="020B0502040204020203" charset="0"/>
+                <a:cs typeface="Bahnschrift" panose="020B0502040204020203" charset="0"/>
+              </a:rPr>
+              <a:t>POST</a:t>
+            </a:r>
+            <a:r>
+              <a:rPr lang="en-US" altLang="en-US" sz="600">
+                <a:latin typeface="Bahnschrift" panose="020B0502040204020203" charset="0"/>
+                <a:cs typeface="Bahnschrift" panose="020B0502040204020203" charset="0"/>
+              </a:rPr>
+              <a:t>, </a:t>
+            </a:r>
+            <a:r>
+              <a:rPr lang="en-US" altLang="en-US" sz="600" b="1">
+                <a:latin typeface="Bahnschrift" panose="020B0502040204020203" charset="0"/>
+                <a:cs typeface="Bahnschrift" panose="020B0502040204020203" charset="0"/>
+              </a:rPr>
+              <a:t>GET</a:t>
+            </a:r>
+            <a:r>
+              <a:rPr lang="en-US" altLang="en-US" sz="600">
+                <a:latin typeface="Bahnschrift" panose="020B0502040204020203" charset="0"/>
+                <a:cs typeface="Bahnschrift" panose="020B0502040204020203" charset="0"/>
+              </a:rPr>
+              <a:t>, </a:t>
+            </a:r>
+            <a:r>
+              <a:rPr lang="en-US" altLang="en-US" sz="600" b="1">
+                <a:latin typeface="Bahnschrift" panose="020B0502040204020203" charset="0"/>
+                <a:cs typeface="Bahnschrift" panose="020B0502040204020203" charset="0"/>
+              </a:rPr>
+              <a:t>PUT</a:t>
+            </a:r>
+            <a:r>
+              <a:rPr lang="en-US" altLang="en-US" sz="600">
+                <a:latin typeface="Bahnschrift" panose="020B0502040204020203" charset="0"/>
+                <a:cs typeface="Bahnschrift" panose="020B0502040204020203" charset="0"/>
+              </a:rPr>
+              <a:t>, </a:t>
+            </a:r>
+            <a:r>
+              <a:rPr lang="en-US" altLang="en-US" sz="600" b="1">
+                <a:latin typeface="Bahnschrift" panose="020B0502040204020203" charset="0"/>
+                <a:cs typeface="Bahnschrift" panose="020B0502040204020203" charset="0"/>
+              </a:rPr>
+              <a:t>DELETE</a:t>
+            </a:r>
+            <a:r>
+              <a:rPr lang="en-US" altLang="en-US" sz="600">
+                <a:latin typeface="Bahnschrift" panose="020B0502040204020203" charset="0"/>
+                <a:cs typeface="Bahnschrift" panose="020B0502040204020203" charset="0"/>
+              </a:rPr>
+              <a:t>. Used Spring Boot Annotations accordingly.</a:t>
+            </a:r>
+            <a:endParaRPr lang="en-US" altLang="en-US" sz="600">
+              <a:latin typeface="Bahnschrift" panose="020B0502040204020203" charset="0"/>
+              <a:cs typeface="Bahnschrift" panose="020B0502040204020203" charset="0"/>
+            </a:endParaRPr>
+          </a:p>
+          <a:p>
+            <a:pPr marL="0" indent="0">
+              <a:buNone/>
+            </a:pPr>
+            <a:r>
+              <a:rPr lang="en-US" altLang="en-US" sz="600" b="1">
+                <a:latin typeface="Bahnschrift" panose="020B0502040204020203" charset="0"/>
+                <a:cs typeface="Bahnschrift" panose="020B0502040204020203" charset="0"/>
+                <a:sym typeface="+mn-ea"/>
+              </a:rPr>
+              <a:t>◦ </a:t>
+            </a:r>
+            <a:r>
+              <a:rPr lang="en-US" altLang="en-US" sz="600">
+                <a:latin typeface="Bahnschrift" panose="020B0502040204020203" charset="0"/>
+                <a:cs typeface="Bahnschrift" panose="020B0502040204020203" charset="0"/>
+                <a:sym typeface="+mn-ea"/>
+              </a:rPr>
+              <a:t>Database Configured and APIs endpoints testing using </a:t>
+            </a:r>
+            <a:r>
+              <a:rPr lang="en-US" altLang="en-US" sz="600" b="1">
+                <a:latin typeface="Bahnschrift" panose="020B0502040204020203" charset="0"/>
+                <a:cs typeface="Bahnschrift" panose="020B0502040204020203" charset="0"/>
+                <a:sym typeface="+mn-ea"/>
+              </a:rPr>
+              <a:t>POSTMAN</a:t>
+            </a:r>
+            <a:r>
+              <a:rPr lang="en-US" altLang="en-US" sz="600">
+                <a:latin typeface="Bahnschrift" panose="020B0502040204020203" charset="0"/>
+                <a:cs typeface="Bahnschrift" panose="020B0502040204020203" charset="0"/>
+                <a:sym typeface="+mn-ea"/>
+              </a:rPr>
+              <a:t>.</a:t>
+            </a:r>
+            <a:endParaRPr lang="en-US" altLang="en-US" sz="600">
               <a:latin typeface="Bahnschrift" panose="020B0502040204020203" charset="0"/>
               <a:cs typeface="Bahnschrift" panose="020B0502040204020203" charset="0"/>
               <a:sym typeface="+mn-ea"/>
@@ -6311,15 +6542,59 @@
               <a:t>◦ </a:t>
             </a:r>
             <a:r>
+              <a:rPr lang="en-US" altLang="en-US" sz="600">
+                <a:latin typeface="Bahnschrift" panose="020B0502040204020203" charset="0"/>
+                <a:cs typeface="Bahnschrift" panose="020B0502040204020203" charset="0"/>
+                <a:sym typeface="+mn-ea"/>
+              </a:rPr>
+              <a:t>Advance JPA DB schemas fetching using custom queries.</a:t>
+            </a:r>
+            <a:endParaRPr lang="en-US" altLang="en-US" sz="600">
+              <a:latin typeface="Bahnschrift" panose="020B0502040204020203" charset="0"/>
+              <a:cs typeface="Bahnschrift" panose="020B0502040204020203" charset="0"/>
+              <a:sym typeface="+mn-ea"/>
+            </a:endParaRPr>
+          </a:p>
+          <a:p>
+            <a:pPr marL="0" indent="0">
+              <a:buNone/>
+            </a:pPr>
+            <a:r>
               <a:rPr lang="en-US" altLang="en-US" sz="600" b="1">
                 <a:latin typeface="Bahnschrift" panose="020B0502040204020203" charset="0"/>
                 <a:cs typeface="Bahnschrift" panose="020B0502040204020203" charset="0"/>
-              </a:rPr>
-              <a:t>Objective: </a:t>
-            </a:r>
-            <a:endParaRPr lang="en-US" altLang="en-US" sz="600" b="1">
-              <a:latin typeface="Bahnschrift" panose="020B0502040204020203" charset="0"/>
-              <a:cs typeface="Bahnschrift" panose="020B0502040204020203" charset="0"/>
+                <a:sym typeface="+mn-ea"/>
+              </a:rPr>
+              <a:t>◦ Pagination and Sorting</a:t>
+            </a:r>
+            <a:r>
+              <a:rPr lang="en-US" altLang="en-US" sz="600">
+                <a:latin typeface="Bahnschrift" panose="020B0502040204020203" charset="0"/>
+                <a:cs typeface="Bahnschrift" panose="020B0502040204020203" charset="0"/>
+                <a:sym typeface="+mn-ea"/>
+              </a:rPr>
+              <a:t> of the data being fetched using </a:t>
+            </a:r>
+            <a:r>
+              <a:rPr lang="en-US" altLang="en-US" sz="600" b="1">
+                <a:latin typeface="Bahnschrift" panose="020B0502040204020203" charset="0"/>
+                <a:cs typeface="Bahnschrift" panose="020B0502040204020203" charset="0"/>
+                <a:sym typeface="+mn-ea"/>
+              </a:rPr>
+              <a:t>Pageable</a:t>
+            </a:r>
+            <a:r>
+              <a:rPr lang="en-US" altLang="en-US" sz="600">
+                <a:latin typeface="Bahnschrift" panose="020B0502040204020203" charset="0"/>
+                <a:cs typeface="Bahnschrift" panose="020B0502040204020203" charset="0"/>
+                <a:sym typeface="+mn-ea"/>
+              </a:rPr>
+              <a:t> interface.</a:t>
+            </a:r>
+            <a:endParaRPr lang="en-US" altLang="en-US" sz="600">
+              <a:latin typeface="Bahnschrift" panose="020B0502040204020203" charset="0"/>
+              <a:cs typeface="Bahnschrift" panose="020B0502040204020203" charset="0"/>
+              <a:sym typeface="+mn-ea"/>
             </a:endParaRPr>
           </a:p>
           <a:p>
@@ -6327,43 +6602,165 @@
               <a:buNone/>
             </a:pPr>
             <a:r>
+              <a:rPr lang="en-US" altLang="en-US" sz="600" b="1">
+                <a:latin typeface="Bahnschrift" panose="020B0502040204020203" charset="0"/>
+                <a:cs typeface="Bahnschrift" panose="020B0502040204020203" charset="0"/>
+                <a:sym typeface="+mn-ea"/>
+              </a:rPr>
+              <a:t>◦ </a:t>
+            </a:r>
+            <a:r>
               <a:rPr lang="en-US" altLang="en-US" sz="600">
                 <a:latin typeface="Bahnschrift" panose="020B0502040204020203" charset="0"/>
                 <a:cs typeface="Bahnschrift" panose="020B0502040204020203" charset="0"/>
-              </a:rPr>
-              <a:t>Build a basic </a:t>
+                <a:sym typeface="+mn-ea"/>
+              </a:rPr>
+              <a:t>Implementation of</a:t>
             </a:r>
             <a:r>
               <a:rPr lang="en-US" altLang="en-US" sz="600" b="1">
                 <a:latin typeface="Bahnschrift" panose="020B0502040204020203" charset="0"/>
                 <a:cs typeface="Bahnschrift" panose="020B0502040204020203" charset="0"/>
-              </a:rPr>
-              <a:t>REST API</a:t>
+                <a:sym typeface="+mn-ea"/>
+              </a:rPr>
+              <a:t> Liquibase (Github of Databases)</a:t>
             </a:r>
             <a:r>
               <a:rPr lang="en-US" altLang="en-US" sz="600">
                 <a:latin typeface="Bahnschrift" panose="020B0502040204020203" charset="0"/>
                 <a:cs typeface="Bahnschrift" panose="020B0502040204020203" charset="0"/>
-              </a:rPr>
-              <a:t> using </a:t>
-            </a:r>
+                <a:sym typeface="+mn-ea"/>
+              </a:rPr>
+              <a:t>, tracking every DB schemas change done efficiently and migrating the DB changes in the next deployment of the application.</a:t>
+            </a:r>
+            <a:endParaRPr lang="en-US" altLang="en-US" sz="600">
+              <a:latin typeface="Bahnschrift" panose="020B0502040204020203" charset="0"/>
+              <a:cs typeface="Bahnschrift" panose="020B0502040204020203" charset="0"/>
+              <a:sym typeface="+mn-ea"/>
+            </a:endParaRPr>
+          </a:p>
+          <a:p>
+            <a:pPr marL="0" indent="0">
+              <a:buNone/>
+            </a:pPr>
             <a:r>
               <a:rPr lang="en-US" altLang="en-US" sz="600" b="1">
                 <a:latin typeface="Bahnschrift" panose="020B0502040204020203" charset="0"/>
                 <a:cs typeface="Bahnschrift" panose="020B0502040204020203" charset="0"/>
-              </a:rPr>
-              <a:t>Spring Boot</a:t>
+                <a:sym typeface="+mn-ea"/>
+              </a:rPr>
+              <a:t>◦ Unit Testing</a:t>
             </a:r>
             <a:r>
               <a:rPr lang="en-US" altLang="en-US" sz="600">
                 <a:latin typeface="Bahnschrift" panose="020B0502040204020203" charset="0"/>
                 <a:cs typeface="Bahnschrift" panose="020B0502040204020203" charset="0"/>
-              </a:rPr>
-              <a:t> that performs CRUD operations on a database table.</a:t>
+                <a:sym typeface="+mn-ea"/>
+              </a:rPr>
+              <a:t> Service Layer (Business Logic) using </a:t>
+            </a:r>
+            <a:r>
+              <a:rPr lang="en-US" altLang="en-US" sz="600" b="1">
+                <a:latin typeface="Bahnschrift" panose="020B0502040204020203" charset="0"/>
+                <a:cs typeface="Bahnschrift" panose="020B0502040204020203" charset="0"/>
+                <a:sym typeface="+mn-ea"/>
+              </a:rPr>
+              <a:t>Mockito</a:t>
+            </a:r>
+            <a:r>
+              <a:rPr lang="en-US" altLang="en-US" sz="600">
+                <a:latin typeface="Bahnschrift" panose="020B0502040204020203" charset="0"/>
+                <a:cs typeface="Bahnschrift" panose="020B0502040204020203" charset="0"/>
+                <a:sym typeface="+mn-ea"/>
+              </a:rPr>
+              <a:t> and Controller Layer (Rest APIs) using </a:t>
+            </a:r>
+            <a:r>
+              <a:rPr lang="en-US" altLang="en-US" sz="600" b="1">
+                <a:latin typeface="Bahnschrift" panose="020B0502040204020203" charset="0"/>
+                <a:cs typeface="Bahnschrift" panose="020B0502040204020203" charset="0"/>
+                <a:sym typeface="+mn-ea"/>
+              </a:rPr>
+              <a:t>@WebMvcTest </a:t>
+            </a:r>
+            <a:r>
+              <a:rPr lang="en-US" altLang="en-US" sz="600">
+                <a:latin typeface="Bahnschrift" panose="020B0502040204020203" charset="0"/>
+                <a:cs typeface="Bahnschrift" panose="020B0502040204020203" charset="0"/>
+                <a:sym typeface="+mn-ea"/>
+              </a:rPr>
+              <a:t>Spring Boot test annotation. </a:t>
             </a:r>
             <a:endParaRPr lang="en-US" altLang="en-US" sz="600">
               <a:latin typeface="Bahnschrift" panose="020B0502040204020203" charset="0"/>
               <a:cs typeface="Bahnschrift" panose="020B0502040204020203" charset="0"/>
+              <a:sym typeface="+mn-ea"/>
+            </a:endParaRPr>
+          </a:p>
+          <a:p>
+            <a:pPr marL="0" indent="0">
+              <a:buNone/>
+            </a:pPr>
+            <a:r>
+              <a:rPr lang="en-US" altLang="en-US" sz="600" b="1">
+                <a:latin typeface="Bahnschrift" panose="020B0502040204020203" charset="0"/>
+                <a:cs typeface="Bahnschrift" panose="020B0502040204020203" charset="0"/>
+                <a:sym typeface="+mn-ea"/>
+              </a:rPr>
+              <a:t>◦ Integration Testing</a:t>
+            </a:r>
+            <a:r>
+              <a:rPr lang="en-US" altLang="en-US" sz="600">
+                <a:latin typeface="Bahnschrift" panose="020B0502040204020203" charset="0"/>
+                <a:cs typeface="Bahnschrift" panose="020B0502040204020203" charset="0"/>
+                <a:sym typeface="+mn-ea"/>
+              </a:rPr>
+              <a:t> of </a:t>
+            </a:r>
+            <a:r>
+              <a:rPr lang="en-US" altLang="en-US" sz="600">
+                <a:latin typeface="Bahnschrift" panose="020B0502040204020203" charset="0"/>
+                <a:cs typeface="Bahnschrift" panose="020B0502040204020203" charset="0"/>
+                <a:sym typeface="+mn-ea"/>
+              </a:rPr>
+              <a:t>Repository Layer (DB Fetching) and Liquibase using </a:t>
+            </a:r>
+            <a:r>
+              <a:rPr lang="en-US" altLang="en-US" sz="600" b="1">
+                <a:latin typeface="Bahnschrift" panose="020B0502040204020203" charset="0"/>
+                <a:cs typeface="Bahnschrift" panose="020B0502040204020203" charset="0"/>
+                <a:sym typeface="+mn-ea"/>
+              </a:rPr>
+              <a:t>@DataJpaTest </a:t>
+            </a:r>
+            <a:r>
+              <a:rPr lang="en-US" altLang="en-US" sz="600">
+                <a:latin typeface="Bahnschrift" panose="020B0502040204020203" charset="0"/>
+                <a:cs typeface="Bahnschrift" panose="020B0502040204020203" charset="0"/>
+                <a:sym typeface="+mn-ea"/>
+              </a:rPr>
+              <a:t>annotation which was done in </a:t>
+            </a:r>
+            <a:r>
+              <a:rPr lang="en-US" altLang="en-US" sz="600" b="1">
+                <a:latin typeface="Bahnschrift" panose="020B0502040204020203" charset="0"/>
+                <a:cs typeface="Bahnschrift" panose="020B0502040204020203" charset="0"/>
+                <a:sym typeface="+mn-ea"/>
+              </a:rPr>
+              <a:t>TestContainers (Docker)</a:t>
+            </a:r>
+            <a:r>
+              <a:rPr lang="en-US" altLang="en-US" sz="600">
+                <a:latin typeface="Bahnschrift" panose="020B0502040204020203" charset="0"/>
+                <a:cs typeface="Bahnschrift" panose="020B0502040204020203" charset="0"/>
+                <a:sym typeface="+mn-ea"/>
+              </a:rPr>
+              <a:t>.</a:t>
+            </a:r>
+            <a:endParaRPr lang="en-US" altLang="en-US" sz="600">
+              <a:latin typeface="Bahnschrift" panose="020B0502040204020203" charset="0"/>
+              <a:cs typeface="Bahnschrift" panose="020B0502040204020203" charset="0"/>
+              <a:sym typeface="+mn-ea"/>
             </a:endParaRPr>
           </a:p>
         </p:txBody>

</xml_diff>